<commit_message>
Protected zip file of capstone materials
</commit_message>
<xml_diff>
--- a/Universal_Design_Workshop_Slides.pptx
+++ b/Universal_Design_Workshop_Slides.pptx
@@ -8383,7 +8383,7 @@
               <a:pPr>
                 <a:defRPr/>
               </a:pPr>
-              <a:t>12/17/2019</a:t>
+              <a:t>8/12/2020</a:t>
             </a:fld>
             <a:endParaRPr lang="en-US"/>
           </a:p>
@@ -8601,7 +8601,7 @@
               <a:pPr>
                 <a:defRPr/>
               </a:pPr>
-              <a:t>12/17/2019</a:t>
+              <a:t>8/12/2020</a:t>
             </a:fld>
             <a:endParaRPr lang="en-US"/>
           </a:p>
@@ -8867,7 +8867,7 @@
               <a:pPr>
                 <a:defRPr/>
               </a:pPr>
-              <a:t>12/17/2019</a:t>
+              <a:t>8/12/2020</a:t>
             </a:fld>
             <a:endParaRPr lang="en-US"/>
           </a:p>
@@ -9258,7 +9258,7 @@
               <a:pPr>
                 <a:defRPr/>
               </a:pPr>
-              <a:t>12/17/2019</a:t>
+              <a:t>8/12/2020</a:t>
             </a:fld>
             <a:endParaRPr lang="en-US"/>
           </a:p>
@@ -9611,7 +9611,7 @@
               <a:pPr>
                 <a:defRPr/>
               </a:pPr>
-              <a:t>12/17/2019</a:t>
+              <a:t>8/12/2020</a:t>
             </a:fld>
             <a:endParaRPr lang="en-US"/>
           </a:p>
@@ -9893,7 +9893,7 @@
               <a:pPr>
                 <a:defRPr/>
               </a:pPr>
-              <a:t>12/17/2019</a:t>
+              <a:t>8/12/2020</a:t>
             </a:fld>
             <a:endParaRPr lang="en-US"/>
           </a:p>
@@ -10282,7 +10282,7 @@
               <a:pPr>
                 <a:defRPr/>
               </a:pPr>
-              <a:t>12/17/2019</a:t>
+              <a:t>8/12/2020</a:t>
             </a:fld>
             <a:endParaRPr lang="en-US"/>
           </a:p>
@@ -10410,7 +10410,7 @@
               <a:pPr>
                 <a:defRPr/>
               </a:pPr>
-              <a:t>12/17/2019</a:t>
+              <a:t>8/12/2020</a:t>
             </a:fld>
             <a:endParaRPr lang="en-US"/>
           </a:p>
@@ -10591,7 +10591,7 @@
               <a:pPr>
                 <a:defRPr/>
               </a:pPr>
-              <a:t>12/17/2019</a:t>
+              <a:t>8/12/2020</a:t>
             </a:fld>
             <a:endParaRPr lang="en-US"/>
           </a:p>
@@ -10955,7 +10955,7 @@
               <a:pPr>
                 <a:defRPr/>
               </a:pPr>
-              <a:t>12/17/2019</a:t>
+              <a:t>8/12/2020</a:t>
             </a:fld>
             <a:endParaRPr lang="en-US"/>
           </a:p>
@@ -11342,7 +11342,7 @@
               <a:pPr>
                 <a:defRPr/>
               </a:pPr>
-              <a:t>12/17/2019</a:t>
+              <a:t>8/12/2020</a:t>
             </a:fld>
             <a:endParaRPr lang="en-US"/>
           </a:p>
@@ -11638,7 +11638,7 @@
               <a:pPr>
                 <a:defRPr/>
               </a:pPr>
-              <a:t>12/17/2019</a:t>
+              <a:t>8/12/2020</a:t>
             </a:fld>
             <a:endParaRPr lang="en-US"/>
           </a:p>
@@ -12232,6 +12232,45 @@
           <a:lstStyle/>
           <a:p>
             <a:endParaRPr lang="en-US" dirty="0"/>
+          </a:p>
+        </p:txBody>
+      </p:sp>
+      <p:sp>
+        <p:nvSpPr>
+          <p:cNvPr id="4" name="TextBox 3">
+            <a:extLst>
+              <a:ext uri="{FF2B5EF4-FFF2-40B4-BE49-F238E27FC236}">
+                <a16:creationId xmlns:a16="http://schemas.microsoft.com/office/drawing/2014/main" id="{567066EC-66B3-43CC-B26A-8B7FD7A6641F}"/>
+              </a:ext>
+            </a:extLst>
+          </p:cNvPr>
+          <p:cNvSpPr txBox="1"/>
+          <p:nvPr/>
+        </p:nvSpPr>
+        <p:spPr>
+          <a:xfrm>
+            <a:off x="381000" y="6400800"/>
+            <a:ext cx="7086600" cy="369332"/>
+          </a:xfrm>
+          <a:prstGeom prst="rect">
+            <a:avLst/>
+          </a:prstGeom>
+          <a:noFill/>
+        </p:spPr>
+        <p:txBody>
+          <a:bodyPr wrap="square" rtlCol="0">
+            <a:spAutoFit/>
+          </a:bodyPr>
+          <a:lstStyle/>
+          <a:p>
+            <a:r>
+              <a:rPr lang="en-US" dirty="0">
+                <a:solidFill>
+                  <a:schemeClr val="bg1"/>
+                </a:solidFill>
+              </a:rPr>
+              <a:t>© Sheila R. Ross, Milwaukee School of Engineering 2019</a:t>
+            </a:r>
           </a:p>
         </p:txBody>
       </p:sp>
@@ -20003,59 +20042,6 @@
 </file>
 
 <file path=customXml/item1.xml><?xml version="1.0" encoding="utf-8"?>
-<p:properties xmlns:p="http://schemas.microsoft.com/office/2006/metadata/properties" xmlns:xsi="http://www.w3.org/2001/XMLSchema-instance" xmlns:pc="http://schemas.microsoft.com/office/infopath/2007/PartnerControls">
-  <documentManagement>
-    <Math_Settings xmlns="322465cc-0484-4afc-830d-f7f2900a1e91" xsi:nil="true"/>
-    <Owner xmlns="322465cc-0484-4afc-830d-f7f2900a1e91">
-      <UserInfo>
-        <DisplayName/>
-        <AccountId xsi:nil="true"/>
-        <AccountType/>
-      </UserInfo>
-    </Owner>
-    <_ip_UnifiedCompliancePolicyUIAction xmlns="http://schemas.microsoft.com/sharepoint/v3" xsi:nil="true"/>
-    <Distribution_Groups xmlns="322465cc-0484-4afc-830d-f7f2900a1e91" xsi:nil="true"/>
-    <LMS_Mappings xmlns="322465cc-0484-4afc-830d-f7f2900a1e91" xsi:nil="true"/>
-    <NotebookType xmlns="322465cc-0484-4afc-830d-f7f2900a1e91" xsi:nil="true"/>
-    <IsNotebookLocked xmlns="322465cc-0484-4afc-830d-f7f2900a1e91" xsi:nil="true"/>
-    <Templates xmlns="322465cc-0484-4afc-830d-f7f2900a1e91" xsi:nil="true"/>
-    <Students xmlns="322465cc-0484-4afc-830d-f7f2900a1e91">
-      <UserInfo>
-        <DisplayName/>
-        <AccountId xsi:nil="true"/>
-        <AccountType/>
-      </UserInfo>
-    </Students>
-    <Student_Groups xmlns="322465cc-0484-4afc-830d-f7f2900a1e91">
-      <UserInfo>
-        <DisplayName/>
-        <AccountId xsi:nil="true"/>
-        <AccountType/>
-      </UserInfo>
-    </Student_Groups>
-    <TeamsChannelId xmlns="322465cc-0484-4afc-830d-f7f2900a1e91" xsi:nil="true"/>
-    <_ip_UnifiedCompliancePolicyProperties xmlns="http://schemas.microsoft.com/sharepoint/v3" xsi:nil="true"/>
-    <Self_Registration_Enabled xmlns="322465cc-0484-4afc-830d-f7f2900a1e91" xsi:nil="true"/>
-    <Has_Teacher_Only_SectionGroup xmlns="322465cc-0484-4afc-830d-f7f2900a1e91" xsi:nil="true"/>
-    <CultureName xmlns="322465cc-0484-4afc-830d-f7f2900a1e91" xsi:nil="true"/>
-    <Invited_Students xmlns="322465cc-0484-4afc-830d-f7f2900a1e91" xsi:nil="true"/>
-    <Is_Collaboration_Space_Locked xmlns="322465cc-0484-4afc-830d-f7f2900a1e91" xsi:nil="true"/>
-    <FolderType xmlns="322465cc-0484-4afc-830d-f7f2900a1e91" xsi:nil="true"/>
-    <Teachers xmlns="322465cc-0484-4afc-830d-f7f2900a1e91">
-      <UserInfo>
-        <DisplayName/>
-        <AccountId xsi:nil="true"/>
-        <AccountType/>
-      </UserInfo>
-    </Teachers>
-    <AppVersion xmlns="322465cc-0484-4afc-830d-f7f2900a1e91" xsi:nil="true"/>
-    <Invited_Teachers xmlns="322465cc-0484-4afc-830d-f7f2900a1e91" xsi:nil="true"/>
-    <DefaultSectionNames xmlns="322465cc-0484-4afc-830d-f7f2900a1e91" xsi:nil="true"/>
-  </documentManagement>
-</p:properties>
-</file>
-
-<file path=customXml/item2.xml><?xml version="1.0" encoding="utf-8"?>
 <ct:contentTypeSchema xmlns:ct="http://schemas.microsoft.com/office/2006/metadata/contentType" xmlns:ma="http://schemas.microsoft.com/office/2006/metadata/properties/metaAttributes" ct:_="" ma:_="" ma:contentTypeName="Document" ma:contentTypeID="0x0101003F5CBAE522F0904ABEBB09D17A01315C" ma:contentTypeVersion="29" ma:contentTypeDescription="Create a new document." ma:contentTypeScope="" ma:versionID="3c651121fab5679b6b6181919eb54fbe">
   <xsd:schema xmlns:xsd="http://www.w3.org/2001/XMLSchema" xmlns:xs="http://www.w3.org/2001/XMLSchema" xmlns:p="http://schemas.microsoft.com/office/2006/metadata/properties" xmlns:ns1="http://schemas.microsoft.com/sharepoint/v3" xmlns:ns3="322465cc-0484-4afc-830d-f7f2900a1e91" xmlns:ns4="c2e1237e-5a86-45e4-acf8-69544c11eea4" targetNamespace="http://schemas.microsoft.com/office/2006/metadata/properties" ma:root="true" ma:fieldsID="b70507b978e6681333d853740507a00f" ns1:_="" ns3:_="" ns4:_="">
     <xsd:import namespace="http://schemas.microsoft.com/sharepoint/v3"/>
@@ -20445,6 +20431,59 @@
 </ct:contentTypeSchema>
 </file>
 
+<file path=customXml/item2.xml><?xml version="1.0" encoding="utf-8"?>
+<p:properties xmlns:p="http://schemas.microsoft.com/office/2006/metadata/properties" xmlns:xsi="http://www.w3.org/2001/XMLSchema-instance" xmlns:pc="http://schemas.microsoft.com/office/infopath/2007/PartnerControls">
+  <documentManagement>
+    <Math_Settings xmlns="322465cc-0484-4afc-830d-f7f2900a1e91" xsi:nil="true"/>
+    <Owner xmlns="322465cc-0484-4afc-830d-f7f2900a1e91">
+      <UserInfo>
+        <DisplayName/>
+        <AccountId xsi:nil="true"/>
+        <AccountType/>
+      </UserInfo>
+    </Owner>
+    <_ip_UnifiedCompliancePolicyUIAction xmlns="http://schemas.microsoft.com/sharepoint/v3" xsi:nil="true"/>
+    <Distribution_Groups xmlns="322465cc-0484-4afc-830d-f7f2900a1e91" xsi:nil="true"/>
+    <LMS_Mappings xmlns="322465cc-0484-4afc-830d-f7f2900a1e91" xsi:nil="true"/>
+    <NotebookType xmlns="322465cc-0484-4afc-830d-f7f2900a1e91" xsi:nil="true"/>
+    <IsNotebookLocked xmlns="322465cc-0484-4afc-830d-f7f2900a1e91" xsi:nil="true"/>
+    <Templates xmlns="322465cc-0484-4afc-830d-f7f2900a1e91" xsi:nil="true"/>
+    <Students xmlns="322465cc-0484-4afc-830d-f7f2900a1e91">
+      <UserInfo>
+        <DisplayName/>
+        <AccountId xsi:nil="true"/>
+        <AccountType/>
+      </UserInfo>
+    </Students>
+    <Student_Groups xmlns="322465cc-0484-4afc-830d-f7f2900a1e91">
+      <UserInfo>
+        <DisplayName/>
+        <AccountId xsi:nil="true"/>
+        <AccountType/>
+      </UserInfo>
+    </Student_Groups>
+    <TeamsChannelId xmlns="322465cc-0484-4afc-830d-f7f2900a1e91" xsi:nil="true"/>
+    <_ip_UnifiedCompliancePolicyProperties xmlns="http://schemas.microsoft.com/sharepoint/v3" xsi:nil="true"/>
+    <Self_Registration_Enabled xmlns="322465cc-0484-4afc-830d-f7f2900a1e91" xsi:nil="true"/>
+    <Has_Teacher_Only_SectionGroup xmlns="322465cc-0484-4afc-830d-f7f2900a1e91" xsi:nil="true"/>
+    <CultureName xmlns="322465cc-0484-4afc-830d-f7f2900a1e91" xsi:nil="true"/>
+    <Invited_Students xmlns="322465cc-0484-4afc-830d-f7f2900a1e91" xsi:nil="true"/>
+    <Is_Collaboration_Space_Locked xmlns="322465cc-0484-4afc-830d-f7f2900a1e91" xsi:nil="true"/>
+    <FolderType xmlns="322465cc-0484-4afc-830d-f7f2900a1e91" xsi:nil="true"/>
+    <Teachers xmlns="322465cc-0484-4afc-830d-f7f2900a1e91">
+      <UserInfo>
+        <DisplayName/>
+        <AccountId xsi:nil="true"/>
+        <AccountType/>
+      </UserInfo>
+    </Teachers>
+    <AppVersion xmlns="322465cc-0484-4afc-830d-f7f2900a1e91" xsi:nil="true"/>
+    <Invited_Teachers xmlns="322465cc-0484-4afc-830d-f7f2900a1e91" xsi:nil="true"/>
+    <DefaultSectionNames xmlns="322465cc-0484-4afc-830d-f7f2900a1e91" xsi:nil="true"/>
+  </documentManagement>
+</p:properties>
+</file>
+
 <file path=customXml/item3.xml><?xml version="1.0" encoding="utf-8"?>
 <?mso-contentType ?>
 <FormTemplates xmlns="http://schemas.microsoft.com/sharepoint/v3/contenttype/forms">
@@ -20455,24 +20494,6 @@
 </file>
 
 <file path=customXml/itemProps1.xml><?xml version="1.0" encoding="utf-8"?>
-<ds:datastoreItem xmlns:ds="http://schemas.openxmlformats.org/officeDocument/2006/customXml" ds:itemID="{FB2958FB-6EAE-410C-9C3A-1BB9DBA45329}">
-  <ds:schemaRefs>
-    <ds:schemaRef ds:uri="322465cc-0484-4afc-830d-f7f2900a1e91"/>
-    <ds:schemaRef ds:uri="http://purl.org/dc/terms/"/>
-    <ds:schemaRef ds:uri="c2e1237e-5a86-45e4-acf8-69544c11eea4"/>
-    <ds:schemaRef ds:uri="http://schemas.microsoft.com/office/2006/documentManagement/types"/>
-    <ds:schemaRef ds:uri="http://schemas.microsoft.com/office/2006/metadata/properties"/>
-    <ds:schemaRef ds:uri="http://schemas.microsoft.com/office/infopath/2007/PartnerControls"/>
-    <ds:schemaRef ds:uri="http://purl.org/dc/elements/1.1/"/>
-    <ds:schemaRef ds:uri="http://schemas.openxmlformats.org/package/2006/metadata/core-properties"/>
-    <ds:schemaRef ds:uri="http://schemas.microsoft.com/sharepoint/v3"/>
-    <ds:schemaRef ds:uri="http://www.w3.org/XML/1998/namespace"/>
-    <ds:schemaRef ds:uri="http://purl.org/dc/dcmitype/"/>
-  </ds:schemaRefs>
-</ds:datastoreItem>
-</file>
-
-<file path=customXml/itemProps2.xml><?xml version="1.0" encoding="utf-8"?>
 <ds:datastoreItem xmlns:ds="http://schemas.openxmlformats.org/officeDocument/2006/customXml" ds:itemID="{389C0816-C10C-45EA-8FB3-460AF19246BB}">
   <ds:schemaRefs>
     <ds:schemaRef ds:uri="http://schemas.microsoft.com/office/2006/metadata/contentType"/>
@@ -20492,6 +20513,24 @@
 </ds:datastoreItem>
 </file>
 
+<file path=customXml/itemProps2.xml><?xml version="1.0" encoding="utf-8"?>
+<ds:datastoreItem xmlns:ds="http://schemas.openxmlformats.org/officeDocument/2006/customXml" ds:itemID="{FB2958FB-6EAE-410C-9C3A-1BB9DBA45329}">
+  <ds:schemaRefs>
+    <ds:schemaRef ds:uri="322465cc-0484-4afc-830d-f7f2900a1e91"/>
+    <ds:schemaRef ds:uri="http://purl.org/dc/terms/"/>
+    <ds:schemaRef ds:uri="c2e1237e-5a86-45e4-acf8-69544c11eea4"/>
+    <ds:schemaRef ds:uri="http://schemas.microsoft.com/office/2006/documentManagement/types"/>
+    <ds:schemaRef ds:uri="http://schemas.microsoft.com/office/2006/metadata/properties"/>
+    <ds:schemaRef ds:uri="http://schemas.microsoft.com/office/infopath/2007/PartnerControls"/>
+    <ds:schemaRef ds:uri="http://purl.org/dc/elements/1.1/"/>
+    <ds:schemaRef ds:uri="http://schemas.openxmlformats.org/package/2006/metadata/core-properties"/>
+    <ds:schemaRef ds:uri="http://schemas.microsoft.com/sharepoint/v3"/>
+    <ds:schemaRef ds:uri="http://www.w3.org/XML/1998/namespace"/>
+    <ds:schemaRef ds:uri="http://purl.org/dc/dcmitype/"/>
+  </ds:schemaRefs>
+</ds:datastoreItem>
+</file>
+
 <file path=customXml/itemProps3.xml><?xml version="1.0" encoding="utf-8"?>
 <ds:datastoreItem xmlns:ds="http://schemas.openxmlformats.org/officeDocument/2006/customXml" ds:itemID="{63924AAF-D6E9-4CB1-91D0-A01E9C70EBB3}">
   <ds:schemaRefs>

</xml_diff>